<commit_message>
:sparkle: add javaclass for getting finance data
</commit_message>
<xml_diff>
--- a/aPlatform/designSource.pptx
+++ b/aPlatform/designSource.pptx
@@ -106,6 +106,11 @@
       </a:defRPr>
     </a:lvl9pPr>
   </p:defaultTextStyle>
+  <p:extLst>
+    <p:ext uri="{EFAFB233-063F-42B5-8137-9DF3F51BA10A}">
+      <p15:sldGuideLst xmlns:p15="http://schemas.microsoft.com/office/powerpoint/2012/main"/>
+    </p:ext>
+  </p:extLst>
 </p:presentation>
 </file>
 
@@ -6055,7 +6060,7 @@
         </p:nvSpPr>
         <p:spPr>
           <a:xfrm>
-            <a:off x="1743711" y="5984086"/>
+            <a:off x="1718767" y="4673195"/>
             <a:ext cx="299492" cy="1311855"/>
           </a:xfrm>
           <a:prstGeom prst="rect">
@@ -6107,7 +6112,7 @@
         </p:nvSpPr>
         <p:spPr>
           <a:xfrm>
-            <a:off x="2292986" y="5984086"/>
+            <a:off x="2268042" y="4673195"/>
             <a:ext cx="299492" cy="1311855"/>
           </a:xfrm>
           <a:prstGeom prst="rect">
@@ -6159,7 +6164,7 @@
         </p:nvSpPr>
         <p:spPr>
           <a:xfrm>
-            <a:off x="2043203" y="6492087"/>
+            <a:off x="2018259" y="5181196"/>
             <a:ext cx="299492" cy="282575"/>
           </a:xfrm>
           <a:prstGeom prst="rect">
@@ -6211,7 +6216,7 @@
         </p:nvSpPr>
         <p:spPr>
           <a:xfrm>
-            <a:off x="1874771" y="5821162"/>
+            <a:off x="1849827" y="4510271"/>
             <a:ext cx="594766" cy="282575"/>
           </a:xfrm>
           <a:prstGeom prst="rect">
@@ -6263,7 +6268,7 @@
         </p:nvSpPr>
         <p:spPr>
           <a:xfrm>
-            <a:off x="3078488" y="5821162"/>
+            <a:off x="3053544" y="4510271"/>
             <a:ext cx="594766" cy="282575"/>
           </a:xfrm>
           <a:prstGeom prst="rect">
@@ -6315,7 +6320,7 @@
         </p:nvSpPr>
         <p:spPr>
           <a:xfrm>
-            <a:off x="3078488" y="6490587"/>
+            <a:off x="3053544" y="5179696"/>
             <a:ext cx="594766" cy="282575"/>
           </a:xfrm>
           <a:prstGeom prst="rect">
@@ -6367,7 +6372,7 @@
         </p:nvSpPr>
         <p:spPr>
           <a:xfrm>
-            <a:off x="2932589" y="5972404"/>
+            <a:off x="2907645" y="4661513"/>
             <a:ext cx="299492" cy="1323538"/>
           </a:xfrm>
           <a:prstGeom prst="rect">
@@ -6419,7 +6424,7 @@
         </p:nvSpPr>
         <p:spPr>
           <a:xfrm>
-            <a:off x="3773964" y="5832774"/>
+            <a:off x="3749020" y="4521883"/>
             <a:ext cx="299492" cy="1463167"/>
           </a:xfrm>
           <a:prstGeom prst="rect">
@@ -6471,7 +6476,7 @@
         </p:nvSpPr>
         <p:spPr>
           <a:xfrm>
-            <a:off x="3502319" y="5972404"/>
+            <a:off x="3477375" y="4661513"/>
             <a:ext cx="299492" cy="665495"/>
           </a:xfrm>
           <a:prstGeom prst="rect">
@@ -6523,7 +6528,7 @@
         </p:nvSpPr>
         <p:spPr>
           <a:xfrm>
-            <a:off x="4615339" y="5984086"/>
+            <a:off x="4590395" y="4673195"/>
             <a:ext cx="299492" cy="1311855"/>
           </a:xfrm>
           <a:prstGeom prst="rect">
@@ -6575,7 +6580,7 @@
         </p:nvSpPr>
         <p:spPr>
           <a:xfrm>
-            <a:off x="5170965" y="5984086"/>
+            <a:off x="5146021" y="4673195"/>
             <a:ext cx="299492" cy="1311855"/>
           </a:xfrm>
           <a:prstGeom prst="rect">
@@ -6627,7 +6632,7 @@
         </p:nvSpPr>
         <p:spPr>
           <a:xfrm>
-            <a:off x="4072049" y="7013366"/>
+            <a:off x="4047105" y="5702475"/>
             <a:ext cx="594766" cy="282575"/>
           </a:xfrm>
           <a:prstGeom prst="rect">
@@ -6679,7 +6684,7 @@
         </p:nvSpPr>
         <p:spPr>
           <a:xfrm>
-            <a:off x="4752347" y="6490586"/>
+            <a:off x="4727403" y="5179695"/>
             <a:ext cx="594766" cy="282575"/>
           </a:xfrm>
           <a:prstGeom prst="rect">
@@ -6731,7 +6736,7 @@
         </p:nvSpPr>
         <p:spPr>
           <a:xfrm>
-            <a:off x="4725945" y="5832774"/>
+            <a:off x="4701001" y="4521883"/>
             <a:ext cx="621168" cy="282575"/>
           </a:xfrm>
           <a:prstGeom prst="rect">
@@ -6783,7 +6788,7 @@
         </p:nvSpPr>
         <p:spPr>
           <a:xfrm>
-            <a:off x="5446985" y="5832774"/>
+            <a:off x="5422041" y="4521883"/>
             <a:ext cx="863418" cy="282575"/>
           </a:xfrm>
           <a:prstGeom prst="rect">
@@ -6835,7 +6840,7 @@
         </p:nvSpPr>
         <p:spPr>
           <a:xfrm>
-            <a:off x="5745685" y="5984086"/>
+            <a:off x="5720741" y="4673195"/>
             <a:ext cx="299492" cy="1311855"/>
           </a:xfrm>
           <a:prstGeom prst="rect">
@@ -6887,7 +6892,7 @@
         </p:nvSpPr>
         <p:spPr>
           <a:xfrm>
-            <a:off x="6320405" y="5832774"/>
+            <a:off x="6295461" y="4521883"/>
             <a:ext cx="863418" cy="282575"/>
           </a:xfrm>
           <a:prstGeom prst="rect">
@@ -6939,7 +6944,7 @@
         </p:nvSpPr>
         <p:spPr>
           <a:xfrm>
-            <a:off x="6320405" y="6594774"/>
+            <a:off x="6295461" y="5283883"/>
             <a:ext cx="745648" cy="282575"/>
           </a:xfrm>
           <a:prstGeom prst="rect">
@@ -6991,7 +6996,7 @@
         </p:nvSpPr>
         <p:spPr>
           <a:xfrm>
-            <a:off x="6322584" y="5984086"/>
+            <a:off x="6297640" y="4673195"/>
             <a:ext cx="299492" cy="1311855"/>
           </a:xfrm>
           <a:prstGeom prst="rect">
@@ -7043,7 +7048,7 @@
         </p:nvSpPr>
         <p:spPr>
           <a:xfrm>
-            <a:off x="7156824" y="5984087"/>
+            <a:off x="7131880" y="4673196"/>
             <a:ext cx="299492" cy="1158876"/>
           </a:xfrm>
           <a:prstGeom prst="rect">
@@ -7095,7 +7100,7 @@
         </p:nvSpPr>
         <p:spPr>
           <a:xfrm>
-            <a:off x="7808607" y="5984087"/>
+            <a:off x="7783663" y="4673196"/>
             <a:ext cx="299492" cy="1158876"/>
           </a:xfrm>
           <a:prstGeom prst="rect">
@@ -7147,7 +7152,7 @@
         </p:nvSpPr>
         <p:spPr>
           <a:xfrm>
-            <a:off x="7306570" y="7013366"/>
+            <a:off x="7281626" y="5702475"/>
             <a:ext cx="566492" cy="282575"/>
           </a:xfrm>
           <a:prstGeom prst="rect">
@@ -7199,7 +7204,7 @@
         </p:nvSpPr>
         <p:spPr>
           <a:xfrm>
-            <a:off x="7306570" y="5830100"/>
+            <a:off x="7281626" y="4519209"/>
             <a:ext cx="566492" cy="282575"/>
           </a:xfrm>
           <a:prstGeom prst="rect">
@@ -7251,7 +7256,7 @@
         </p:nvSpPr>
         <p:spPr>
           <a:xfrm>
-            <a:off x="7990790" y="5830100"/>
+            <a:off x="7965846" y="4519209"/>
             <a:ext cx="566492" cy="282575"/>
           </a:xfrm>
           <a:prstGeom prst="rect">
@@ -7303,7 +7308,7 @@
         </p:nvSpPr>
         <p:spPr>
           <a:xfrm>
-            <a:off x="7990790" y="6646837"/>
+            <a:off x="7965846" y="5335946"/>
             <a:ext cx="566492" cy="282575"/>
           </a:xfrm>
           <a:prstGeom prst="rect">
@@ -7355,7 +7360,7 @@
         </p:nvSpPr>
         <p:spPr>
           <a:xfrm>
-            <a:off x="7991064" y="5984087"/>
+            <a:off x="7966120" y="4673196"/>
             <a:ext cx="299492" cy="1311854"/>
           </a:xfrm>
           <a:prstGeom prst="rect">
@@ -7407,7 +7412,7 @@
         </p:nvSpPr>
         <p:spPr>
           <a:xfrm>
-            <a:off x="8449526" y="6490585"/>
+            <a:off x="8424582" y="5179694"/>
             <a:ext cx="224683" cy="282575"/>
           </a:xfrm>
           <a:prstGeom prst="rect">
@@ -7459,7 +7464,7 @@
         </p:nvSpPr>
         <p:spPr>
           <a:xfrm>
-            <a:off x="8449526" y="5971387"/>
+            <a:off x="8424582" y="4660496"/>
             <a:ext cx="224683" cy="282575"/>
           </a:xfrm>
           <a:prstGeom prst="rect">
@@ -7511,7 +7516,7 @@
         </p:nvSpPr>
         <p:spPr>
           <a:xfrm>
-            <a:off x="8610650" y="6231819"/>
+            <a:off x="8536278" y="4920928"/>
             <a:ext cx="224683" cy="282575"/>
           </a:xfrm>
           <a:prstGeom prst="rect">
@@ -7563,7 +7568,7 @@
         </p:nvSpPr>
         <p:spPr>
           <a:xfrm>
-            <a:off x="8833179" y="5984087"/>
+            <a:off x="8808235" y="4673196"/>
             <a:ext cx="299492" cy="1311854"/>
           </a:xfrm>
           <a:prstGeom prst="rect">
@@ -7615,7 +7620,7 @@
         </p:nvSpPr>
         <p:spPr>
           <a:xfrm>
-            <a:off x="8610649" y="6773161"/>
+            <a:off x="8536277" y="5462270"/>
             <a:ext cx="224683" cy="365122"/>
           </a:xfrm>
           <a:prstGeom prst="rect">
@@ -7667,7 +7672,7 @@
         </p:nvSpPr>
         <p:spPr>
           <a:xfrm>
-            <a:off x="8610650" y="7017803"/>
+            <a:off x="8536278" y="5706912"/>
             <a:ext cx="224683" cy="282575"/>
           </a:xfrm>
           <a:prstGeom prst="rect">
@@ -7719,7 +7724,7 @@
         </p:nvSpPr>
         <p:spPr>
           <a:xfrm>
-            <a:off x="8450480" y="6561347"/>
+            <a:off x="8425536" y="5250456"/>
             <a:ext cx="224683" cy="365122"/>
           </a:xfrm>
           <a:prstGeom prst="rect">
@@ -7771,7 +7776,7 @@
         </p:nvSpPr>
         <p:spPr>
           <a:xfrm>
-            <a:off x="9211259" y="5984087"/>
+            <a:off x="9186315" y="4673196"/>
             <a:ext cx="299492" cy="1311854"/>
           </a:xfrm>
           <a:prstGeom prst="rect">
@@ -7823,7 +7828,7 @@
         </p:nvSpPr>
         <p:spPr>
           <a:xfrm>
-            <a:off x="9593776" y="5984087"/>
+            <a:off x="9568832" y="4673196"/>
             <a:ext cx="299492" cy="1311854"/>
           </a:xfrm>
           <a:prstGeom prst="rect">
@@ -7875,7 +7880,7 @@
         </p:nvSpPr>
         <p:spPr>
           <a:xfrm>
-            <a:off x="9086440" y="5830100"/>
+            <a:off x="9061496" y="4519209"/>
             <a:ext cx="566492" cy="282575"/>
           </a:xfrm>
           <a:prstGeom prst="rect">
@@ -17410,10 +17415,10 @@
       </p:grpSp>
       <p:grpSp>
         <p:nvGrpSpPr>
-          <p:cNvPr id="189" name="그룹 188">
+          <p:cNvPr id="228" name="그룹 227">
             <a:extLst>
               <a:ext uri="{FF2B5EF4-FFF2-40B4-BE49-F238E27FC236}">
-                <a16:creationId xmlns:a16="http://schemas.microsoft.com/office/drawing/2014/main" id="{6C4FA6E7-84CF-4881-94B7-B25A46D3A3A2}"/>
+                <a16:creationId xmlns:a16="http://schemas.microsoft.com/office/drawing/2014/main" id="{06556D7A-69DD-4DDF-BF5B-683E32F963AE}"/>
               </a:ext>
             </a:extLst>
           </p:cNvPr>
@@ -17422,10 +17427,10 @@
         </p:nvGrpSpPr>
         <p:grpSpPr>
           <a:xfrm>
-            <a:off x="8557972" y="83602"/>
-            <a:ext cx="8149557" cy="1479216"/>
-            <a:chOff x="1529308" y="4409075"/>
-            <a:chExt cx="8149557" cy="1479216"/>
+            <a:off x="8857385" y="1759559"/>
+            <a:ext cx="8149557" cy="1474780"/>
+            <a:chOff x="8557972" y="83602"/>
+            <a:chExt cx="8149557" cy="1474780"/>
           </a:xfrm>
         </p:grpSpPr>
         <p:sp>
@@ -17442,7 +17447,7 @@
           </p:nvSpPr>
           <p:spPr>
             <a:xfrm>
-              <a:off x="1529308" y="4571999"/>
+              <a:off x="8557972" y="246526"/>
               <a:ext cx="299492" cy="1311855"/>
             </a:xfrm>
             <a:prstGeom prst="rect">
@@ -17494,7 +17499,7 @@
           </p:nvSpPr>
           <p:spPr>
             <a:xfrm>
-              <a:off x="2078583" y="4571999"/>
+              <a:off x="9107247" y="246526"/>
               <a:ext cx="299492" cy="1311855"/>
             </a:xfrm>
             <a:prstGeom prst="rect">
@@ -17546,7 +17551,7 @@
           </p:nvSpPr>
           <p:spPr>
             <a:xfrm>
-              <a:off x="1828800" y="5080000"/>
+              <a:off x="8857464" y="754527"/>
               <a:ext cx="299492" cy="282575"/>
             </a:xfrm>
             <a:prstGeom prst="rect">
@@ -17598,7 +17603,7 @@
           </p:nvSpPr>
           <p:spPr>
             <a:xfrm>
-              <a:off x="1660368" y="4409075"/>
+              <a:off x="8689032" y="83602"/>
               <a:ext cx="594766" cy="282575"/>
             </a:xfrm>
             <a:prstGeom prst="rect">
@@ -17650,7 +17655,7 @@
           </p:nvSpPr>
           <p:spPr>
             <a:xfrm>
-              <a:off x="2864085" y="4409075"/>
+              <a:off x="9892749" y="83602"/>
               <a:ext cx="594766" cy="282575"/>
             </a:xfrm>
             <a:prstGeom prst="rect">
@@ -17702,7 +17707,7 @@
           </p:nvSpPr>
           <p:spPr>
             <a:xfrm>
-              <a:off x="2864085" y="5078500"/>
+              <a:off x="9892749" y="753027"/>
               <a:ext cx="594766" cy="282575"/>
             </a:xfrm>
             <a:prstGeom prst="rect">
@@ -17754,7 +17759,7 @@
           </p:nvSpPr>
           <p:spPr>
             <a:xfrm>
-              <a:off x="2718186" y="4560317"/>
+              <a:off x="9746850" y="234844"/>
               <a:ext cx="299492" cy="1323538"/>
             </a:xfrm>
             <a:prstGeom prst="rect">
@@ -17806,7 +17811,7 @@
           </p:nvSpPr>
           <p:spPr>
             <a:xfrm>
-              <a:off x="3559561" y="4420687"/>
+              <a:off x="10588225" y="95214"/>
               <a:ext cx="299492" cy="1463167"/>
             </a:xfrm>
             <a:prstGeom prst="rect">
@@ -17858,7 +17863,7 @@
           </p:nvSpPr>
           <p:spPr>
             <a:xfrm>
-              <a:off x="3287916" y="4560317"/>
+              <a:off x="10316580" y="234844"/>
               <a:ext cx="299492" cy="665495"/>
             </a:xfrm>
             <a:prstGeom prst="rect">
@@ -17910,7 +17915,7 @@
           </p:nvSpPr>
           <p:spPr>
             <a:xfrm>
-              <a:off x="4400936" y="4571999"/>
+              <a:off x="11429600" y="246526"/>
               <a:ext cx="299492" cy="1311855"/>
             </a:xfrm>
             <a:prstGeom prst="rect">
@@ -17962,7 +17967,7 @@
           </p:nvSpPr>
           <p:spPr>
             <a:xfrm>
-              <a:off x="4956562" y="4571999"/>
+              <a:off x="11985226" y="246526"/>
               <a:ext cx="299492" cy="1311855"/>
             </a:xfrm>
             <a:prstGeom prst="rect">
@@ -18014,7 +18019,7 @@
           </p:nvSpPr>
           <p:spPr>
             <a:xfrm>
-              <a:off x="3857646" y="5601279"/>
+              <a:off x="10886310" y="1275806"/>
               <a:ext cx="594766" cy="282575"/>
             </a:xfrm>
             <a:prstGeom prst="rect">
@@ -18066,7 +18071,7 @@
           </p:nvSpPr>
           <p:spPr>
             <a:xfrm>
-              <a:off x="4537944" y="5078499"/>
+              <a:off x="11566608" y="753026"/>
               <a:ext cx="594766" cy="282575"/>
             </a:xfrm>
             <a:prstGeom prst="rect">
@@ -18118,7 +18123,7 @@
           </p:nvSpPr>
           <p:spPr>
             <a:xfrm>
-              <a:off x="4511542" y="4420687"/>
+              <a:off x="11540206" y="95214"/>
               <a:ext cx="621168" cy="282575"/>
             </a:xfrm>
             <a:prstGeom prst="rect">
@@ -18170,7 +18175,7 @@
           </p:nvSpPr>
           <p:spPr>
             <a:xfrm>
-              <a:off x="5232582" y="4420687"/>
+              <a:off x="12261246" y="95214"/>
               <a:ext cx="863418" cy="282575"/>
             </a:xfrm>
             <a:prstGeom prst="rect">
@@ -18222,7 +18227,7 @@
           </p:nvSpPr>
           <p:spPr>
             <a:xfrm>
-              <a:off x="5531282" y="4571999"/>
+              <a:off x="12559946" y="246526"/>
               <a:ext cx="299492" cy="1311855"/>
             </a:xfrm>
             <a:prstGeom prst="rect">
@@ -18274,7 +18279,7 @@
           </p:nvSpPr>
           <p:spPr>
             <a:xfrm>
-              <a:off x="6106002" y="4420687"/>
+              <a:off x="13134666" y="95214"/>
               <a:ext cx="863418" cy="282575"/>
             </a:xfrm>
             <a:prstGeom prst="rect">
@@ -18326,7 +18331,7 @@
           </p:nvSpPr>
           <p:spPr>
             <a:xfrm>
-              <a:off x="6106002" y="5182687"/>
+              <a:off x="13134666" y="857214"/>
               <a:ext cx="745648" cy="282575"/>
             </a:xfrm>
             <a:prstGeom prst="rect">
@@ -18378,7 +18383,7 @@
           </p:nvSpPr>
           <p:spPr>
             <a:xfrm>
-              <a:off x="6108181" y="4571999"/>
+              <a:off x="13136845" y="246526"/>
               <a:ext cx="299492" cy="1311855"/>
             </a:xfrm>
             <a:prstGeom prst="rect">
@@ -18430,7 +18435,7 @@
           </p:nvSpPr>
           <p:spPr>
             <a:xfrm>
-              <a:off x="6942421" y="4572000"/>
+              <a:off x="13971085" y="246527"/>
               <a:ext cx="299492" cy="1158876"/>
             </a:xfrm>
             <a:prstGeom prst="rect">
@@ -18482,7 +18487,7 @@
           </p:nvSpPr>
           <p:spPr>
             <a:xfrm>
-              <a:off x="7594204" y="4572000"/>
+              <a:off x="14622868" y="246527"/>
               <a:ext cx="299492" cy="1158876"/>
             </a:xfrm>
             <a:prstGeom prst="rect">
@@ -18534,7 +18539,7 @@
           </p:nvSpPr>
           <p:spPr>
             <a:xfrm>
-              <a:off x="7092167" y="5601279"/>
+              <a:off x="14120831" y="1275806"/>
               <a:ext cx="566492" cy="282575"/>
             </a:xfrm>
             <a:prstGeom prst="rect">
@@ -18586,7 +18591,7 @@
           </p:nvSpPr>
           <p:spPr>
             <a:xfrm>
-              <a:off x="7092167" y="4418013"/>
+              <a:off x="14120831" y="92540"/>
               <a:ext cx="566492" cy="282575"/>
             </a:xfrm>
             <a:prstGeom prst="rect">
@@ -18638,7 +18643,7 @@
           </p:nvSpPr>
           <p:spPr>
             <a:xfrm>
-              <a:off x="7776387" y="4418013"/>
+              <a:off x="14805051" y="92540"/>
               <a:ext cx="566492" cy="282575"/>
             </a:xfrm>
             <a:prstGeom prst="rect">
@@ -18690,7 +18695,7 @@
           </p:nvSpPr>
           <p:spPr>
             <a:xfrm>
-              <a:off x="7776387" y="5234750"/>
+              <a:off x="14805051" y="909277"/>
               <a:ext cx="566492" cy="282575"/>
             </a:xfrm>
             <a:prstGeom prst="rect">
@@ -18742,7 +18747,7 @@
           </p:nvSpPr>
           <p:spPr>
             <a:xfrm>
-              <a:off x="7776661" y="4572000"/>
+              <a:off x="14805325" y="246527"/>
               <a:ext cx="299492" cy="1311854"/>
             </a:xfrm>
             <a:prstGeom prst="rect">
@@ -18794,7 +18799,7 @@
           </p:nvSpPr>
           <p:spPr>
             <a:xfrm>
-              <a:off x="8235123" y="5078498"/>
+              <a:off x="15263787" y="753025"/>
               <a:ext cx="224683" cy="282575"/>
             </a:xfrm>
             <a:prstGeom prst="rect">
@@ -18846,7 +18851,7 @@
           </p:nvSpPr>
           <p:spPr>
             <a:xfrm>
-              <a:off x="8235123" y="4559300"/>
+              <a:off x="15263787" y="233827"/>
               <a:ext cx="224683" cy="282575"/>
             </a:xfrm>
             <a:prstGeom prst="rect">
@@ -18898,7 +18903,7 @@
           </p:nvSpPr>
           <p:spPr>
             <a:xfrm>
-              <a:off x="8396247" y="4819732"/>
+              <a:off x="15424911" y="494259"/>
               <a:ext cx="224683" cy="282575"/>
             </a:xfrm>
             <a:prstGeom prst="rect">
@@ -18950,7 +18955,7 @@
           </p:nvSpPr>
           <p:spPr>
             <a:xfrm>
-              <a:off x="8618776" y="4572000"/>
+              <a:off x="15647440" y="246527"/>
               <a:ext cx="299492" cy="1311854"/>
             </a:xfrm>
             <a:prstGeom prst="rect">
@@ -19002,7 +19007,7 @@
           </p:nvSpPr>
           <p:spPr>
             <a:xfrm>
-              <a:off x="8396246" y="5361074"/>
+              <a:off x="15382575" y="1035601"/>
               <a:ext cx="224683" cy="365122"/>
             </a:xfrm>
             <a:prstGeom prst="rect">
@@ -19054,7 +19059,7 @@
           </p:nvSpPr>
           <p:spPr>
             <a:xfrm>
-              <a:off x="8396247" y="5605716"/>
+              <a:off x="15382576" y="1271776"/>
               <a:ext cx="224683" cy="282575"/>
             </a:xfrm>
             <a:prstGeom prst="rect">
@@ -19106,7 +19111,7 @@
           </p:nvSpPr>
           <p:spPr>
             <a:xfrm>
-              <a:off x="8236077" y="5149260"/>
+              <a:off x="15264741" y="823787"/>
               <a:ext cx="224683" cy="365122"/>
             </a:xfrm>
             <a:prstGeom prst="rect">
@@ -19158,7 +19163,7 @@
           </p:nvSpPr>
           <p:spPr>
             <a:xfrm>
-              <a:off x="8996856" y="4572000"/>
+              <a:off x="16025520" y="246527"/>
               <a:ext cx="299492" cy="1311854"/>
             </a:xfrm>
             <a:prstGeom prst="rect">
@@ -19210,7 +19215,7 @@
           </p:nvSpPr>
           <p:spPr>
             <a:xfrm>
-              <a:off x="9379373" y="4572000"/>
+              <a:off x="16408037" y="246527"/>
               <a:ext cx="299492" cy="1311854"/>
             </a:xfrm>
             <a:prstGeom prst="rect">
@@ -19262,7 +19267,7 @@
           </p:nvSpPr>
           <p:spPr>
             <a:xfrm>
-              <a:off x="8872037" y="4418013"/>
+              <a:off x="15900701" y="92540"/>
               <a:ext cx="566492" cy="282575"/>
             </a:xfrm>
             <a:prstGeom prst="rect">

</xml_diff>